<commit_message>
Update Video Game Sales Presentation.pptx
</commit_message>
<xml_diff>
--- a/Video Game Sales Presentation.pptx
+++ b/Video Game Sales Presentation.pptx
@@ -118,6 +118,11 @@
       </a:defRPr>
     </a:lvl9pPr>
   </p:defaultTextStyle>
+  <p:extLst>
+    <p:ext uri="{EFAFB233-063F-42B5-8137-9DF3F51BA10A}">
+      <p15:sldGuideLst xmlns:p15="http://schemas.microsoft.com/office/powerpoint/2012/main"/>
+    </p:ext>
+  </p:extLst>
 </p:presentation>
 </file>
 
@@ -134,7 +139,7 @@
   <pc:docChgLst>
     <pc:chgData name="Nathan Reed" userId="651a36f5c3eb5597" providerId="LiveId" clId="{A6C1F353-DCB9-46B0-9257-0FF4BBDC1DD0}"/>
     <pc:docChg chg="undo custSel addSld modSld">
-      <pc:chgData name="Nathan Reed" userId="651a36f5c3eb5597" providerId="LiveId" clId="{A6C1F353-DCB9-46B0-9257-0FF4BBDC1DD0}" dt="2023-06-03T02:06:45.755" v="4591" actId="26606"/>
+      <pc:chgData name="Nathan Reed" userId="651a36f5c3eb5597" providerId="LiveId" clId="{A6C1F353-DCB9-46B0-9257-0FF4BBDC1DD0}" dt="2023-06-03T17:56:27.436" v="4738" actId="20577"/>
       <pc:docMkLst>
         <pc:docMk/>
       </pc:docMkLst>
@@ -289,7 +294,7 @@
         </pc:picChg>
       </pc:sldChg>
       <pc:sldChg chg="addSp delSp modSp new mod setBg">
-        <pc:chgData name="Nathan Reed" userId="651a36f5c3eb5597" providerId="LiveId" clId="{A6C1F353-DCB9-46B0-9257-0FF4BBDC1DD0}" dt="2023-06-03T00:02:20.609" v="1498" actId="20577"/>
+        <pc:chgData name="Nathan Reed" userId="651a36f5c3eb5597" providerId="LiveId" clId="{A6C1F353-DCB9-46B0-9257-0FF4BBDC1DD0}" dt="2023-06-03T17:54:29.456" v="4619" actId="20577"/>
         <pc:sldMkLst>
           <pc:docMk/>
           <pc:sldMk cId="3853237440" sldId="258"/>
@@ -319,7 +324,7 @@
           </ac:spMkLst>
         </pc:spChg>
         <pc:spChg chg="add mod">
-          <ac:chgData name="Nathan Reed" userId="651a36f5c3eb5597" providerId="LiveId" clId="{A6C1F353-DCB9-46B0-9257-0FF4BBDC1DD0}" dt="2023-06-03T00:02:20.609" v="1498" actId="20577"/>
+          <ac:chgData name="Nathan Reed" userId="651a36f5c3eb5597" providerId="LiveId" clId="{A6C1F353-DCB9-46B0-9257-0FF4BBDC1DD0}" dt="2023-06-03T17:54:29.456" v="4619" actId="20577"/>
           <ac:spMkLst>
             <pc:docMk/>
             <pc:sldMk cId="3853237440" sldId="258"/>
@@ -648,7 +653,7 @@
         </pc:picChg>
       </pc:sldChg>
       <pc:sldChg chg="addSp delSp modSp new mod setBg">
-        <pc:chgData name="Nathan Reed" userId="651a36f5c3eb5597" providerId="LiveId" clId="{A6C1F353-DCB9-46B0-9257-0FF4BBDC1DD0}" dt="2023-06-03T00:05:06.082" v="1545" actId="20577"/>
+        <pc:chgData name="Nathan Reed" userId="651a36f5c3eb5597" providerId="LiveId" clId="{A6C1F353-DCB9-46B0-9257-0FF4BBDC1DD0}" dt="2023-06-03T17:55:39.054" v="4689" actId="27636"/>
         <pc:sldMkLst>
           <pc:docMk/>
           <pc:sldMk cId="939280574" sldId="259"/>
@@ -670,7 +675,7 @@
           </ac:spMkLst>
         </pc:spChg>
         <pc:spChg chg="add mod">
-          <ac:chgData name="Nathan Reed" userId="651a36f5c3eb5597" providerId="LiveId" clId="{A6C1F353-DCB9-46B0-9257-0FF4BBDC1DD0}" dt="2023-06-03T00:05:06.082" v="1545" actId="20577"/>
+          <ac:chgData name="Nathan Reed" userId="651a36f5c3eb5597" providerId="LiveId" clId="{A6C1F353-DCB9-46B0-9257-0FF4BBDC1DD0}" dt="2023-06-03T17:55:39.054" v="4689" actId="27636"/>
           <ac:spMkLst>
             <pc:docMk/>
             <pc:sldMk cId="939280574" sldId="259"/>
@@ -871,7 +876,7 @@
         </pc:picChg>
       </pc:sldChg>
       <pc:sldChg chg="addSp delSp modSp add mod">
-        <pc:chgData name="Nathan Reed" userId="651a36f5c3eb5597" providerId="LiveId" clId="{A6C1F353-DCB9-46B0-9257-0FF4BBDC1DD0}" dt="2023-06-03T00:11:14.408" v="1647" actId="14100"/>
+        <pc:chgData name="Nathan Reed" userId="651a36f5c3eb5597" providerId="LiveId" clId="{A6C1F353-DCB9-46B0-9257-0FF4BBDC1DD0}" dt="2023-06-03T17:55:30.329" v="4687" actId="20577"/>
         <pc:sldMkLst>
           <pc:docMk/>
           <pc:sldMk cId="3782266765" sldId="260"/>
@@ -885,7 +890,7 @@
           </ac:spMkLst>
         </pc:spChg>
         <pc:spChg chg="mod">
-          <ac:chgData name="Nathan Reed" userId="651a36f5c3eb5597" providerId="LiveId" clId="{A6C1F353-DCB9-46B0-9257-0FF4BBDC1DD0}" dt="2023-06-03T00:11:14.408" v="1647" actId="14100"/>
+          <ac:chgData name="Nathan Reed" userId="651a36f5c3eb5597" providerId="LiveId" clId="{A6C1F353-DCB9-46B0-9257-0FF4BBDC1DD0}" dt="2023-06-03T17:55:30.329" v="4687" actId="20577"/>
           <ac:spMkLst>
             <pc:docMk/>
             <pc:sldMk cId="3782266765" sldId="260"/>
@@ -918,7 +923,7 @@
         </pc:picChg>
       </pc:sldChg>
       <pc:sldChg chg="addSp delSp modSp add mod">
-        <pc:chgData name="Nathan Reed" userId="651a36f5c3eb5597" providerId="LiveId" clId="{A6C1F353-DCB9-46B0-9257-0FF4BBDC1DD0}" dt="2023-06-03T00:14:15.024" v="1707" actId="27636"/>
+        <pc:chgData name="Nathan Reed" userId="651a36f5c3eb5597" providerId="LiveId" clId="{A6C1F353-DCB9-46B0-9257-0FF4BBDC1DD0}" dt="2023-06-03T17:56:07.249" v="4713" actId="20577"/>
         <pc:sldMkLst>
           <pc:docMk/>
           <pc:sldMk cId="431376358" sldId="261"/>
@@ -932,7 +937,7 @@
           </ac:spMkLst>
         </pc:spChg>
         <pc:spChg chg="mod">
-          <ac:chgData name="Nathan Reed" userId="651a36f5c3eb5597" providerId="LiveId" clId="{A6C1F353-DCB9-46B0-9257-0FF4BBDC1DD0}" dt="2023-06-03T00:14:15.024" v="1707" actId="27636"/>
+          <ac:chgData name="Nathan Reed" userId="651a36f5c3eb5597" providerId="LiveId" clId="{A6C1F353-DCB9-46B0-9257-0FF4BBDC1DD0}" dt="2023-06-03T17:56:07.249" v="4713" actId="20577"/>
           <ac:spMkLst>
             <pc:docMk/>
             <pc:sldMk cId="431376358" sldId="261"/>
@@ -957,7 +962,7 @@
         </pc:picChg>
       </pc:sldChg>
       <pc:sldChg chg="addSp delSp modSp add mod">
-        <pc:chgData name="Nathan Reed" userId="651a36f5c3eb5597" providerId="LiveId" clId="{A6C1F353-DCB9-46B0-9257-0FF4BBDC1DD0}" dt="2023-06-03T00:16:14.258" v="1775" actId="20577"/>
+        <pc:chgData name="Nathan Reed" userId="651a36f5c3eb5597" providerId="LiveId" clId="{A6C1F353-DCB9-46B0-9257-0FF4BBDC1DD0}" dt="2023-06-03T17:56:27.436" v="4738" actId="20577"/>
         <pc:sldMkLst>
           <pc:docMk/>
           <pc:sldMk cId="1172603598" sldId="262"/>
@@ -971,7 +976,7 @@
           </ac:spMkLst>
         </pc:spChg>
         <pc:spChg chg="mod">
-          <ac:chgData name="Nathan Reed" userId="651a36f5c3eb5597" providerId="LiveId" clId="{A6C1F353-DCB9-46B0-9257-0FF4BBDC1DD0}" dt="2023-06-03T00:16:14.258" v="1775" actId="20577"/>
+          <ac:chgData name="Nathan Reed" userId="651a36f5c3eb5597" providerId="LiveId" clId="{A6C1F353-DCB9-46B0-9257-0FF4BBDC1DD0}" dt="2023-06-03T17:56:27.436" v="4738" actId="20577"/>
           <ac:spMkLst>
             <pc:docMk/>
             <pc:sldMk cId="1172603598" sldId="262"/>
@@ -9201,7 +9206,7 @@
           <a:p>
             <a:fld id="{23FEA57E-7C1A-457B-A4CD-5DCEB057B502}" type="datetime1">
               <a:rPr lang="en-US" smtClean="0"/>
-              <a:t>6/2/2023</a:t>
+              <a:t>6/3/2023</a:t>
             </a:fld>
             <a:endParaRPr lang="en-US" dirty="0"/>
           </a:p>
@@ -9404,7 +9409,7 @@
           <a:p>
             <a:fld id="{11789749-A4CD-447F-8298-2B7988C91CEA}" type="datetime1">
               <a:rPr lang="en-US" smtClean="0"/>
-              <a:t>6/2/2023</a:t>
+              <a:t>6/3/2023</a:t>
             </a:fld>
             <a:endParaRPr lang="en-US"/>
           </a:p>
@@ -9615,7 +9620,7 @@
           <a:p>
             <a:fld id="{BA0444D3-C0BA-4587-A56C-581AB9F841BE}" type="datetime1">
               <a:rPr lang="en-US" smtClean="0"/>
-              <a:t>6/2/2023</a:t>
+              <a:t>6/3/2023</a:t>
             </a:fld>
             <a:endParaRPr lang="en-US"/>
           </a:p>
@@ -9829,7 +9834,7 @@
           <a:p>
             <a:fld id="{201AF2CE-4F37-411C-A3EE-BBBE223265BF}" type="datetime1">
               <a:rPr lang="en-US" smtClean="0"/>
-              <a:t>6/2/2023</a:t>
+              <a:t>6/3/2023</a:t>
             </a:fld>
             <a:endParaRPr lang="en-US"/>
           </a:p>
@@ -10110,7 +10115,7 @@
           <a:p>
             <a:fld id="{C96083D4-708C-4BB5-B4FD-30CE9FA12FD5}" type="datetime1">
               <a:rPr lang="en-US" smtClean="0"/>
-              <a:t>6/2/2023</a:t>
+              <a:t>6/3/2023</a:t>
             </a:fld>
             <a:endParaRPr lang="en-US"/>
           </a:p>
@@ -10390,7 +10395,7 @@
           <a:p>
             <a:fld id="{D0D239B2-65BC-4C2A-A62B-3EABFE9590E4}" type="datetime1">
               <a:rPr lang="en-US" smtClean="0"/>
-              <a:t>6/2/2023</a:t>
+              <a:t>6/3/2023</a:t>
             </a:fld>
             <a:endParaRPr lang="en-US"/>
           </a:p>
@@ -10812,7 +10817,7 @@
           <a:p>
             <a:fld id="{85E05F5A-E4A3-476F-A89E-C2B73F2431E4}" type="datetime1">
               <a:rPr lang="en-US" smtClean="0"/>
-              <a:t>6/2/2023</a:t>
+              <a:t>6/3/2023</a:t>
             </a:fld>
             <a:endParaRPr lang="en-US"/>
           </a:p>
@@ -10957,7 +10962,7 @@
           <a:p>
             <a:fld id="{E3761515-4A26-4F31-9F61-5A10B1FABBFC}" type="datetime1">
               <a:rPr lang="en-US" smtClean="0"/>
-              <a:t>6/2/2023</a:t>
+              <a:t>6/3/2023</a:t>
             </a:fld>
             <a:endParaRPr lang="en-US"/>
           </a:p>
@@ -11073,7 +11078,7 @@
           <a:p>
             <a:fld id="{4A75DC65-7D1F-4BAB-9695-F7E734143E14}" type="datetime1">
               <a:rPr lang="en-US" smtClean="0"/>
-              <a:t>6/2/2023</a:t>
+              <a:t>6/3/2023</a:t>
             </a:fld>
             <a:endParaRPr lang="en-US"/>
           </a:p>
@@ -11387,7 +11392,7 @@
           <a:p>
             <a:fld id="{7E624077-BD55-4036-8E92-6558FDF3B653}" type="datetime1">
               <a:rPr lang="en-US" smtClean="0"/>
-              <a:t>6/2/2023</a:t>
+              <a:t>6/3/2023</a:t>
             </a:fld>
             <a:endParaRPr lang="en-US"/>
           </a:p>
@@ -11681,7 +11686,7 @@
           <a:p>
             <a:fld id="{804225F2-7107-4609-BCC2-77C63064A5E8}" type="datetime1">
               <a:rPr lang="en-US" smtClean="0"/>
-              <a:t>6/2/2023</a:t>
+              <a:t>6/3/2023</a:t>
             </a:fld>
             <a:endParaRPr lang="en-US"/>
           </a:p>
@@ -11929,7 +11934,7 @@
           <a:p>
             <a:fld id="{D3FE42E8-8B57-452D-A122-4DCE9AC771EF}" type="datetime1">
               <a:rPr lang="en-US" smtClean="0"/>
-              <a:t>6/2/2023</a:t>
+              <a:t>6/3/2023</a:t>
             </a:fld>
             <a:endParaRPr lang="en-US"/>
           </a:p>
@@ -15153,7 +15158,7 @@
         </p:spPr>
         <p:txBody>
           <a:bodyPr vert="horz" lIns="91440" tIns="45720" rIns="91440" bIns="45720" rtlCol="0">
-            <a:normAutofit/>
+            <a:normAutofit lnSpcReduction="10000"/>
           </a:bodyPr>
           <a:lstStyle/>
           <a:p>
@@ -15316,6 +15321,24 @@
                 </a:solidFill>
               </a:rPr>
               <a:t>Max: 98.0</a:t>
+            </a:r>
+          </a:p>
+          <a:p>
+            <a:pPr marL="742950" lvl="1" indent="-228600">
+              <a:spcAft>
+                <a:spcPts val="600"/>
+              </a:spcAft>
+              <a:buSzPct val="70000"/>
+              <a:buFont typeface="Arial" panose="020B0604020202020204" pitchFamily="34" charset="0"/>
+              <a:buChar char="•"/>
+            </a:pPr>
+            <a:r>
+              <a:rPr lang="en-US" sz="2000" dirty="0">
+                <a:solidFill>
+                  <a:schemeClr val="tx2"/>
+                </a:solidFill>
+              </a:rPr>
+              <a:t>Standard deviation: 13.9</a:t>
             </a:r>
           </a:p>
           <a:p>
@@ -15609,7 +15632,7 @@
         <p:spPr>
           <a:xfrm>
             <a:off x="6096002" y="1814732"/>
-            <a:ext cx="5426844" cy="4186018"/>
+            <a:ext cx="5426844" cy="4703404"/>
           </a:xfrm>
           <a:prstGeom prst="rect">
             <a:avLst/>
@@ -15780,6 +15803,24 @@
                 </a:solidFill>
               </a:rPr>
               <a:t>Max: 9.6</a:t>
+            </a:r>
+          </a:p>
+          <a:p>
+            <a:pPr marL="742950" lvl="1" indent="-228600">
+              <a:spcAft>
+                <a:spcPts val="600"/>
+              </a:spcAft>
+              <a:buSzPct val="70000"/>
+              <a:buFont typeface="Arial" panose="020B0604020202020204" pitchFamily="34" charset="0"/>
+              <a:buChar char="•"/>
+            </a:pPr>
+            <a:r>
+              <a:rPr lang="en-US" sz="2000" dirty="0">
+                <a:solidFill>
+                  <a:schemeClr val="tx2"/>
+                </a:solidFill>
+              </a:rPr>
+              <a:t>Standard deviation: 1.4</a:t>
             </a:r>
           </a:p>
           <a:p>
@@ -16072,7 +16113,7 @@
         <p:spPr>
           <a:xfrm>
             <a:off x="6096002" y="1244185"/>
-            <a:ext cx="5426844" cy="5099465"/>
+            <a:ext cx="5426844" cy="5342353"/>
           </a:xfrm>
           <a:prstGeom prst="rect">
             <a:avLst/>
@@ -16243,6 +16284,24 @@
                 </a:solidFill>
               </a:rPr>
               <a:t>Max: 41.36</a:t>
+            </a:r>
+          </a:p>
+          <a:p>
+            <a:pPr marL="742950" lvl="1" indent="-228600">
+              <a:spcAft>
+                <a:spcPts val="600"/>
+              </a:spcAft>
+              <a:buSzPct val="70000"/>
+              <a:buFont typeface="Arial" panose="020B0604020202020204" pitchFamily="34" charset="0"/>
+              <a:buChar char="•"/>
+            </a:pPr>
+            <a:r>
+              <a:rPr lang="en-US" sz="2900" dirty="0">
+                <a:solidFill>
+                  <a:schemeClr val="tx2"/>
+                </a:solidFill>
+              </a:rPr>
+              <a:t>Standard deviation: 1.0</a:t>
             </a:r>
           </a:p>
           <a:p>
@@ -16750,6 +16809,24 @@
             </a:r>
           </a:p>
           <a:p>
+            <a:pPr marL="742950" lvl="1" indent="-228600">
+              <a:spcAft>
+                <a:spcPts val="600"/>
+              </a:spcAft>
+              <a:buSzPct val="70000"/>
+              <a:buFont typeface="Arial" panose="020B0604020202020204" pitchFamily="34" charset="0"/>
+              <a:buChar char="•"/>
+            </a:pPr>
+            <a:r>
+              <a:rPr lang="en-US" sz="2200" dirty="0">
+                <a:solidFill>
+                  <a:schemeClr val="tx2"/>
+                </a:solidFill>
+              </a:rPr>
+              <a:t>Standard deviation: 0.3</a:t>
+            </a:r>
+          </a:p>
+          <a:p>
             <a:pPr marL="285750" indent="-228600">
               <a:spcAft>
                 <a:spcPts val="600"/>
@@ -17075,7 +17152,7 @@
         </p:spPr>
         <p:txBody>
           <a:bodyPr vert="horz" lIns="91440" tIns="45720" rIns="91440" bIns="45720" rtlCol="0">
-            <a:normAutofit fontScale="92500" lnSpcReduction="10000"/>
+            <a:normAutofit fontScale="92500" lnSpcReduction="20000"/>
           </a:bodyPr>
           <a:lstStyle/>
           <a:p>
@@ -17239,6 +17316,29 @@
               </a:rPr>
               <a:t>Max: 82.53</a:t>
             </a:r>
+          </a:p>
+          <a:p>
+            <a:pPr marL="742950" lvl="1" indent="-228600">
+              <a:spcAft>
+                <a:spcPts val="600"/>
+              </a:spcAft>
+              <a:buSzPct val="70000"/>
+              <a:buFont typeface="Arial" panose="020B0604020202020204" pitchFamily="34" charset="0"/>
+              <a:buChar char="•"/>
+            </a:pPr>
+            <a:r>
+              <a:rPr lang="en-US" sz="2000">
+                <a:solidFill>
+                  <a:schemeClr val="tx2"/>
+                </a:solidFill>
+              </a:rPr>
+              <a:t>Standard deviation: 2.0</a:t>
+            </a:r>
+            <a:endParaRPr lang="en-US" sz="2000" dirty="0">
+              <a:solidFill>
+                <a:schemeClr val="tx2"/>
+              </a:solidFill>
+            </a:endParaRPr>
           </a:p>
           <a:p>
             <a:pPr marL="285750" indent="-228600">

</xml_diff>